<commit_message>
Report - Bhavika's writeup, final slides, updated viz :rocket:
</commit_message>
<xml_diff>
--- a/CS688_ProjectPresentation.pptx
+++ b/CS688_ProjectPresentation.pptx
@@ -6616,7 +6616,7 @@
             <a:tbl>
               <a:tblPr>
                 <a:noFill/>
-                <a:tableStyleId>{0E698BE7-EC0E-44A5-98A6-8F536189F404}</a:tableStyleId>
+                <a:tableStyleId>{7F63CBA0-0911-4D7F-9609-D5D0AB325C68}</a:tableStyleId>
               </a:tblPr>
               <a:tblGrid>
                 <a:gridCol w="4108075"/>
@@ -7652,7 +7652,7 @@
             <a:tbl>
               <a:tblPr>
                 <a:noFill/>
-                <a:tableStyleId>{0E698BE7-EC0E-44A5-98A6-8F536189F404}</a:tableStyleId>
+                <a:tableStyleId>{7F63CBA0-0911-4D7F-9609-D5D0AB325C68}</a:tableStyleId>
               </a:tblPr>
               <a:tblGrid>
                 <a:gridCol w="1947400"/>
@@ -8422,7 +8422,7 @@
             <a:tbl>
               <a:tblPr>
                 <a:noFill/>
-                <a:tableStyleId>{0E698BE7-EC0E-44A5-98A6-8F536189F404}</a:tableStyleId>
+                <a:tableStyleId>{7F63CBA0-0911-4D7F-9609-D5D0AB325C68}</a:tableStyleId>
               </a:tblPr>
               <a:tblGrid>
                 <a:gridCol w="1208550"/>

</xml_diff>